<commit_message>
Updated Documentation with minor changes, and uploaded short pres temp.
</commit_message>
<xml_diff>
--- a/Documentation/SRDesignInitial.pptx
+++ b/Documentation/SRDesignInitial.pptx
@@ -8,6 +8,14 @@
     <p:sldId id="256" r:id="rId2"/>
     <p:sldId id="257" r:id="rId3"/>
     <p:sldId id="258" r:id="rId4"/>
+    <p:sldId id="259" r:id="rId5"/>
+    <p:sldId id="267" r:id="rId6"/>
+    <p:sldId id="260" r:id="rId7"/>
+    <p:sldId id="266" r:id="rId8"/>
+    <p:sldId id="261" r:id="rId9"/>
+    <p:sldId id="262" r:id="rId10"/>
+    <p:sldId id="263" r:id="rId11"/>
+    <p:sldId id="264" r:id="rId12"/>
   </p:sldIdLst>
   <p:sldSz cx="12192000" cy="6858000"/>
   <p:notesSz cx="6858000" cy="9144000"/>
@@ -243,7 +251,7 @@
           <a:p>
             <a:fld id="{7FACDBFC-33C5-4961-AEF7-C18C455E79A7}" type="datetimeFigureOut">
               <a:rPr lang="en-US" smtClean="0"/>
-              <a:t>9/11/2017</a:t>
+              <a:t>11/9/2017</a:t>
             </a:fld>
             <a:endParaRPr lang="en-US"/>
           </a:p>
@@ -411,7 +419,7 @@
           <a:p>
             <a:fld id="{7FACDBFC-33C5-4961-AEF7-C18C455E79A7}" type="datetimeFigureOut">
               <a:rPr lang="en-US" smtClean="0"/>
-              <a:t>9/11/2017</a:t>
+              <a:t>11/9/2017</a:t>
             </a:fld>
             <a:endParaRPr lang="en-US"/>
           </a:p>
@@ -589,7 +597,7 @@
           <a:p>
             <a:fld id="{7FACDBFC-33C5-4961-AEF7-C18C455E79A7}" type="datetimeFigureOut">
               <a:rPr lang="en-US" smtClean="0"/>
-              <a:t>9/11/2017</a:t>
+              <a:t>11/9/2017</a:t>
             </a:fld>
             <a:endParaRPr lang="en-US"/>
           </a:p>
@@ -757,7 +765,7 @@
           <a:p>
             <a:fld id="{7FACDBFC-33C5-4961-AEF7-C18C455E79A7}" type="datetimeFigureOut">
               <a:rPr lang="en-US" smtClean="0"/>
-              <a:t>9/11/2017</a:t>
+              <a:t>11/9/2017</a:t>
             </a:fld>
             <a:endParaRPr lang="en-US"/>
           </a:p>
@@ -1002,7 +1010,7 @@
           <a:p>
             <a:fld id="{7FACDBFC-33C5-4961-AEF7-C18C455E79A7}" type="datetimeFigureOut">
               <a:rPr lang="en-US" smtClean="0"/>
-              <a:t>9/11/2017</a:t>
+              <a:t>11/9/2017</a:t>
             </a:fld>
             <a:endParaRPr lang="en-US"/>
           </a:p>
@@ -1231,7 +1239,7 @@
           <a:p>
             <a:fld id="{7FACDBFC-33C5-4961-AEF7-C18C455E79A7}" type="datetimeFigureOut">
               <a:rPr lang="en-US" smtClean="0"/>
-              <a:t>9/11/2017</a:t>
+              <a:t>11/9/2017</a:t>
             </a:fld>
             <a:endParaRPr lang="en-US"/>
           </a:p>
@@ -1595,7 +1603,7 @@
           <a:p>
             <a:fld id="{7FACDBFC-33C5-4961-AEF7-C18C455E79A7}" type="datetimeFigureOut">
               <a:rPr lang="en-US" smtClean="0"/>
-              <a:t>9/11/2017</a:t>
+              <a:t>11/9/2017</a:t>
             </a:fld>
             <a:endParaRPr lang="en-US"/>
           </a:p>
@@ -1712,7 +1720,7 @@
           <a:p>
             <a:fld id="{7FACDBFC-33C5-4961-AEF7-C18C455E79A7}" type="datetimeFigureOut">
               <a:rPr lang="en-US" smtClean="0"/>
-              <a:t>9/11/2017</a:t>
+              <a:t>11/9/2017</a:t>
             </a:fld>
             <a:endParaRPr lang="en-US"/>
           </a:p>
@@ -1807,7 +1815,7 @@
           <a:p>
             <a:fld id="{7FACDBFC-33C5-4961-AEF7-C18C455E79A7}" type="datetimeFigureOut">
               <a:rPr lang="en-US" smtClean="0"/>
-              <a:t>9/11/2017</a:t>
+              <a:t>11/9/2017</a:t>
             </a:fld>
             <a:endParaRPr lang="en-US"/>
           </a:p>
@@ -2082,7 +2090,7 @@
           <a:p>
             <a:fld id="{7FACDBFC-33C5-4961-AEF7-C18C455E79A7}" type="datetimeFigureOut">
               <a:rPr lang="en-US" smtClean="0"/>
-              <a:t>9/11/2017</a:t>
+              <a:t>11/9/2017</a:t>
             </a:fld>
             <a:endParaRPr lang="en-US"/>
           </a:p>
@@ -2334,7 +2342,7 @@
           <a:p>
             <a:fld id="{7FACDBFC-33C5-4961-AEF7-C18C455E79A7}" type="datetimeFigureOut">
               <a:rPr lang="en-US" smtClean="0"/>
-              <a:t>9/11/2017</a:t>
+              <a:t>11/9/2017</a:t>
             </a:fld>
             <a:endParaRPr lang="en-US"/>
           </a:p>
@@ -2545,7 +2553,7 @@
           <a:p>
             <a:fld id="{7FACDBFC-33C5-4961-AEF7-C18C455E79A7}" type="datetimeFigureOut">
               <a:rPr lang="en-US" smtClean="0"/>
-              <a:t>9/11/2017</a:t>
+              <a:t>11/9/2017</a:t>
             </a:fld>
             <a:endParaRPr lang="en-US"/>
           </a:p>
@@ -3056,6 +3064,158 @@
 </p:sld>
 </file>
 
+<file path=ppt/slides/slide10.xml><?xml version="1.0" encoding="utf-8"?>
+<p:sld xmlns:a="http://schemas.openxmlformats.org/drawingml/2006/main" xmlns:r="http://schemas.openxmlformats.org/officeDocument/2006/relationships" xmlns:p="http://schemas.openxmlformats.org/presentationml/2006/main">
+  <p:cSld>
+    <p:spTree>
+      <p:nvGrpSpPr>
+        <p:cNvPr id="1" name=""/>
+        <p:cNvGrpSpPr/>
+        <p:nvPr/>
+      </p:nvGrpSpPr>
+      <p:grpSpPr>
+        <a:xfrm>
+          <a:off x="0" y="0"/>
+          <a:ext cx="0" cy="0"/>
+          <a:chOff x="0" y="0"/>
+          <a:chExt cx="0" cy="0"/>
+        </a:xfrm>
+      </p:grpSpPr>
+      <p:sp>
+        <p:nvSpPr>
+          <p:cNvPr id="2" name="Title 1"/>
+          <p:cNvSpPr>
+            <a:spLocks noGrp="1"/>
+          </p:cNvSpPr>
+          <p:nvPr>
+            <p:ph type="title"/>
+          </p:nvPr>
+        </p:nvSpPr>
+        <p:spPr/>
+        <p:txBody>
+          <a:bodyPr/>
+          <a:lstStyle/>
+          <a:p>
+            <a:r>
+              <a:rPr lang="en-US" dirty="0"/>
+              <a:t>Sample Data </a:t>
+            </a:r>
+            <a:r>
+              <a:rPr lang="en-US" dirty="0" smtClean="0"/>
+              <a:t>Files</a:t>
+            </a:r>
+            <a:endParaRPr lang="en-US" dirty="0"/>
+          </a:p>
+        </p:txBody>
+      </p:sp>
+      <p:sp>
+        <p:nvSpPr>
+          <p:cNvPr id="3" name="Content Placeholder 2"/>
+          <p:cNvSpPr>
+            <a:spLocks noGrp="1"/>
+          </p:cNvSpPr>
+          <p:nvPr>
+            <p:ph idx="1"/>
+          </p:nvPr>
+        </p:nvSpPr>
+        <p:spPr/>
+        <p:txBody>
+          <a:bodyPr/>
+          <a:lstStyle/>
+          <a:p>
+            <a:endParaRPr lang="en-US"/>
+          </a:p>
+        </p:txBody>
+      </p:sp>
+    </p:spTree>
+    <p:extLst>
+      <p:ext uri="{BB962C8B-B14F-4D97-AF65-F5344CB8AC3E}">
+        <p14:creationId xmlns:p14="http://schemas.microsoft.com/office/powerpoint/2010/main" val="3682776124"/>
+      </p:ext>
+    </p:extLst>
+  </p:cSld>
+  <p:clrMapOvr>
+    <a:masterClrMapping/>
+  </p:clrMapOvr>
+</p:sld>
+</file>
+
+<file path=ppt/slides/slide11.xml><?xml version="1.0" encoding="utf-8"?>
+<p:sld xmlns:a="http://schemas.openxmlformats.org/drawingml/2006/main" xmlns:r="http://schemas.openxmlformats.org/officeDocument/2006/relationships" xmlns:p="http://schemas.openxmlformats.org/presentationml/2006/main">
+  <p:cSld>
+    <p:spTree>
+      <p:nvGrpSpPr>
+        <p:cNvPr id="1" name=""/>
+        <p:cNvGrpSpPr/>
+        <p:nvPr/>
+      </p:nvGrpSpPr>
+      <p:grpSpPr>
+        <a:xfrm>
+          <a:off x="0" y="0"/>
+          <a:ext cx="0" cy="0"/>
+          <a:chOff x="0" y="0"/>
+          <a:chExt cx="0" cy="0"/>
+        </a:xfrm>
+      </p:grpSpPr>
+      <p:sp>
+        <p:nvSpPr>
+          <p:cNvPr id="2" name="Title 1"/>
+          <p:cNvSpPr>
+            <a:spLocks noGrp="1"/>
+          </p:cNvSpPr>
+          <p:nvPr>
+            <p:ph type="title"/>
+          </p:nvPr>
+        </p:nvSpPr>
+        <p:spPr/>
+        <p:txBody>
+          <a:bodyPr/>
+          <a:lstStyle/>
+          <a:p>
+            <a:r>
+              <a:rPr lang="en-US" dirty="0"/>
+              <a:t>Testing </a:t>
+            </a:r>
+            <a:r>
+              <a:rPr lang="en-US" dirty="0" smtClean="0"/>
+              <a:t>Suite</a:t>
+            </a:r>
+            <a:endParaRPr lang="en-US" dirty="0"/>
+          </a:p>
+        </p:txBody>
+      </p:sp>
+      <p:sp>
+        <p:nvSpPr>
+          <p:cNvPr id="3" name="Content Placeholder 2"/>
+          <p:cNvSpPr>
+            <a:spLocks noGrp="1"/>
+          </p:cNvSpPr>
+          <p:nvPr>
+            <p:ph idx="1"/>
+          </p:nvPr>
+        </p:nvSpPr>
+        <p:spPr/>
+        <p:txBody>
+          <a:bodyPr/>
+          <a:lstStyle/>
+          <a:p>
+            <a:endParaRPr lang="en-US"/>
+          </a:p>
+        </p:txBody>
+      </p:sp>
+    </p:spTree>
+    <p:extLst>
+      <p:ext uri="{BB962C8B-B14F-4D97-AF65-F5344CB8AC3E}">
+        <p14:creationId xmlns:p14="http://schemas.microsoft.com/office/powerpoint/2010/main" val="958658524"/>
+      </p:ext>
+    </p:extLst>
+  </p:cSld>
+  <p:clrMapOvr>
+    <a:masterClrMapping/>
+  </p:clrMapOvr>
+</p:sld>
+</file>
+
 <file path=ppt/slides/slide2.xml><?xml version="1.0" encoding="utf-8"?>
 <p:sld xmlns:a="http://schemas.openxmlformats.org/drawingml/2006/main" xmlns:r="http://schemas.openxmlformats.org/officeDocument/2006/relationships" xmlns:p="http://schemas.openxmlformats.org/presentationml/2006/main">
   <p:cSld>
@@ -3254,37 +3414,38 @@
           <a:lstStyle/>
           <a:p>
             <a:r>
-              <a:rPr lang="en-US"/>
+              <a:rPr lang="en-US" dirty="0"/>
               <a:t>Software Requirements Specification</a:t>
             </a:r>
           </a:p>
           <a:p>
             <a:r>
-              <a:rPr lang="en-US"/>
+              <a:rPr lang="en-US" dirty="0"/>
               <a:t>Web Application</a:t>
             </a:r>
           </a:p>
           <a:p>
             <a:r>
-              <a:rPr lang="en-US"/>
+              <a:rPr lang="en-US" dirty="0"/>
               <a:t>Database</a:t>
             </a:r>
           </a:p>
           <a:p>
             <a:r>
-              <a:rPr lang="en-US"/>
+              <a:rPr lang="en-US" dirty="0"/>
               <a:t>User Manual</a:t>
             </a:r>
           </a:p>
           <a:p>
             <a:r>
-              <a:rPr lang="en-US"/>
-              <a:t>Sample files</a:t>
-            </a:r>
-          </a:p>
-          <a:p>
-            <a:r>
-              <a:rPr lang="en-US"/>
+              <a:rPr lang="en-US" dirty="0" smtClean="0"/>
+              <a:t>Sample Data Files</a:t>
+            </a:r>
+            <a:endParaRPr lang="en-US" dirty="0"/>
+          </a:p>
+          <a:p>
+            <a:r>
+              <a:rPr lang="en-US" dirty="0"/>
               <a:t>Testing Suite</a:t>
             </a:r>
           </a:p>
@@ -3292,7 +3453,7 @@
             <a:pPr marL="0" indent="0">
               <a:buNone/>
             </a:pPr>
-            <a:endParaRPr lang="en-US"/>
+            <a:endParaRPr lang="en-US" dirty="0"/>
           </a:p>
         </p:txBody>
       </p:sp>
@@ -3300,6 +3461,551 @@
     <p:extLst>
       <p:ext uri="{BB962C8B-B14F-4D97-AF65-F5344CB8AC3E}">
         <p14:creationId xmlns:p14="http://schemas.microsoft.com/office/powerpoint/2010/main" val="3648438544"/>
+      </p:ext>
+    </p:extLst>
+  </p:cSld>
+  <p:clrMapOvr>
+    <a:masterClrMapping/>
+  </p:clrMapOvr>
+</p:sld>
+</file>
+
+<file path=ppt/slides/slide4.xml><?xml version="1.0" encoding="utf-8"?>
+<p:sld xmlns:a="http://schemas.openxmlformats.org/drawingml/2006/main" xmlns:r="http://schemas.openxmlformats.org/officeDocument/2006/relationships" xmlns:p="http://schemas.openxmlformats.org/presentationml/2006/main">
+  <p:cSld>
+    <p:spTree>
+      <p:nvGrpSpPr>
+        <p:cNvPr id="1" name=""/>
+        <p:cNvGrpSpPr/>
+        <p:nvPr/>
+      </p:nvGrpSpPr>
+      <p:grpSpPr>
+        <a:xfrm>
+          <a:off x="0" y="0"/>
+          <a:ext cx="0" cy="0"/>
+          <a:chOff x="0" y="0"/>
+          <a:chExt cx="0" cy="0"/>
+        </a:xfrm>
+      </p:grpSpPr>
+      <p:sp>
+        <p:nvSpPr>
+          <p:cNvPr id="2" name="Title 1"/>
+          <p:cNvSpPr>
+            <a:spLocks noGrp="1"/>
+          </p:cNvSpPr>
+          <p:nvPr>
+            <p:ph type="title"/>
+          </p:nvPr>
+        </p:nvSpPr>
+        <p:spPr/>
+        <p:txBody>
+          <a:bodyPr/>
+          <a:lstStyle/>
+          <a:p>
+            <a:r>
+              <a:rPr lang="en-US" dirty="0"/>
+              <a:t>Software Requirements </a:t>
+            </a:r>
+            <a:r>
+              <a:rPr lang="en-US" dirty="0" smtClean="0"/>
+              <a:t>Specification</a:t>
+            </a:r>
+            <a:endParaRPr lang="en-US" dirty="0"/>
+          </a:p>
+        </p:txBody>
+      </p:sp>
+      <p:sp>
+        <p:nvSpPr>
+          <p:cNvPr id="3" name="Content Placeholder 2"/>
+          <p:cNvSpPr>
+            <a:spLocks noGrp="1"/>
+          </p:cNvSpPr>
+          <p:nvPr>
+            <p:ph idx="1"/>
+          </p:nvPr>
+        </p:nvSpPr>
+        <p:spPr>
+          <a:xfrm>
+            <a:off x="838200" y="1825624"/>
+            <a:ext cx="5780460" cy="4724645"/>
+          </a:xfrm>
+        </p:spPr>
+        <p:txBody>
+          <a:bodyPr>
+            <a:normAutofit/>
+          </a:bodyPr>
+          <a:lstStyle/>
+          <a:p>
+            <a:r>
+              <a:rPr lang="en-US" dirty="0" smtClean="0"/>
+              <a:t>Currently 45 pages, due to increase.</a:t>
+            </a:r>
+          </a:p>
+          <a:p>
+            <a:r>
+              <a:rPr lang="en-US" dirty="0" smtClean="0"/>
+              <a:t>The team, project manager, and client use this.</a:t>
+            </a:r>
+          </a:p>
+          <a:p>
+            <a:pPr marL="0" indent="0">
+              <a:buNone/>
+            </a:pPr>
+            <a:r>
+              <a:rPr lang="en-US" dirty="0" smtClean="0"/>
+              <a:t>Contains:</a:t>
+            </a:r>
+          </a:p>
+          <a:p>
+            <a:r>
+              <a:rPr lang="en-US" dirty="0" smtClean="0"/>
+              <a:t>High level needs</a:t>
+            </a:r>
+          </a:p>
+          <a:p>
+            <a:r>
+              <a:rPr lang="en-US" dirty="0" smtClean="0"/>
+              <a:t>Use Cases</a:t>
+            </a:r>
+          </a:p>
+          <a:p>
+            <a:r>
+              <a:rPr lang="en-US" dirty="0" smtClean="0"/>
+              <a:t>Requirements</a:t>
+            </a:r>
+          </a:p>
+          <a:p>
+            <a:pPr lvl="1"/>
+            <a:r>
+              <a:rPr lang="en-US" dirty="0" smtClean="0"/>
+              <a:t>Functional</a:t>
+            </a:r>
+          </a:p>
+          <a:p>
+            <a:pPr lvl="1"/>
+            <a:r>
+              <a:rPr lang="en-US" dirty="0" smtClean="0"/>
+              <a:t>Non-functional</a:t>
+            </a:r>
+          </a:p>
+          <a:p>
+            <a:r>
+              <a:rPr lang="en-US" dirty="0" smtClean="0"/>
+              <a:t>Future Enhancements</a:t>
+            </a:r>
+          </a:p>
+        </p:txBody>
+      </p:sp>
+      <p:pic>
+        <p:nvPicPr>
+          <p:cNvPr id="6" name="Picture 5"/>
+          <p:cNvPicPr>
+            <a:picLocks noChangeAspect="1"/>
+          </p:cNvPicPr>
+          <p:nvPr/>
+        </p:nvPicPr>
+        <p:blipFill>
+          <a:blip r:embed="rId2"/>
+          <a:stretch>
+            <a:fillRect/>
+          </a:stretch>
+        </p:blipFill>
+        <p:spPr>
+          <a:xfrm>
+            <a:off x="6994533" y="1690688"/>
+            <a:ext cx="3983394" cy="5167312"/>
+          </a:xfrm>
+          <a:prstGeom prst="rect">
+            <a:avLst/>
+          </a:prstGeom>
+        </p:spPr>
+      </p:pic>
+    </p:spTree>
+    <p:extLst>
+      <p:ext uri="{BB962C8B-B14F-4D97-AF65-F5344CB8AC3E}">
+        <p14:creationId xmlns:p14="http://schemas.microsoft.com/office/powerpoint/2010/main" val="2953660847"/>
+      </p:ext>
+    </p:extLst>
+  </p:cSld>
+  <p:clrMapOvr>
+    <a:masterClrMapping/>
+  </p:clrMapOvr>
+</p:sld>
+</file>
+
+<file path=ppt/slides/slide5.xml><?xml version="1.0" encoding="utf-8"?>
+<p:sld xmlns:a="http://schemas.openxmlformats.org/drawingml/2006/main" xmlns:r="http://schemas.openxmlformats.org/officeDocument/2006/relationships" xmlns:p="http://schemas.openxmlformats.org/presentationml/2006/main">
+  <p:cSld>
+    <p:spTree>
+      <p:nvGrpSpPr>
+        <p:cNvPr id="1" name=""/>
+        <p:cNvGrpSpPr/>
+        <p:nvPr/>
+      </p:nvGrpSpPr>
+      <p:grpSpPr>
+        <a:xfrm>
+          <a:off x="0" y="0"/>
+          <a:ext cx="0" cy="0"/>
+          <a:chOff x="0" y="0"/>
+          <a:chExt cx="0" cy="0"/>
+        </a:xfrm>
+      </p:grpSpPr>
+      <p:sp>
+        <p:nvSpPr>
+          <p:cNvPr id="2" name="Title 1"/>
+          <p:cNvSpPr>
+            <a:spLocks noGrp="1"/>
+          </p:cNvSpPr>
+          <p:nvPr>
+            <p:ph type="title"/>
+          </p:nvPr>
+        </p:nvSpPr>
+        <p:spPr/>
+        <p:txBody>
+          <a:bodyPr/>
+          <a:lstStyle/>
+          <a:p>
+            <a:endParaRPr lang="en-US"/>
+          </a:p>
+        </p:txBody>
+      </p:sp>
+      <p:sp>
+        <p:nvSpPr>
+          <p:cNvPr id="3" name="Content Placeholder 2"/>
+          <p:cNvSpPr>
+            <a:spLocks noGrp="1"/>
+          </p:cNvSpPr>
+          <p:nvPr>
+            <p:ph idx="1"/>
+          </p:nvPr>
+        </p:nvSpPr>
+        <p:spPr/>
+        <p:txBody>
+          <a:bodyPr/>
+          <a:lstStyle/>
+          <a:p>
+            <a:endParaRPr lang="en-US"/>
+          </a:p>
+        </p:txBody>
+      </p:sp>
+    </p:spTree>
+    <p:extLst>
+      <p:ext uri="{BB962C8B-B14F-4D97-AF65-F5344CB8AC3E}">
+        <p14:creationId xmlns:p14="http://schemas.microsoft.com/office/powerpoint/2010/main" val="406411252"/>
+      </p:ext>
+    </p:extLst>
+  </p:cSld>
+  <p:clrMapOvr>
+    <a:masterClrMapping/>
+  </p:clrMapOvr>
+</p:sld>
+</file>
+
+<file path=ppt/slides/slide6.xml><?xml version="1.0" encoding="utf-8"?>
+<p:sld xmlns:a="http://schemas.openxmlformats.org/drawingml/2006/main" xmlns:r="http://schemas.openxmlformats.org/officeDocument/2006/relationships" xmlns:p="http://schemas.openxmlformats.org/presentationml/2006/main">
+  <p:cSld>
+    <p:spTree>
+      <p:nvGrpSpPr>
+        <p:cNvPr id="1" name=""/>
+        <p:cNvGrpSpPr/>
+        <p:nvPr/>
+      </p:nvGrpSpPr>
+      <p:grpSpPr>
+        <a:xfrm>
+          <a:off x="0" y="0"/>
+          <a:ext cx="0" cy="0"/>
+          <a:chOff x="0" y="0"/>
+          <a:chExt cx="0" cy="0"/>
+        </a:xfrm>
+      </p:grpSpPr>
+      <p:sp>
+        <p:nvSpPr>
+          <p:cNvPr id="2" name="Title 1"/>
+          <p:cNvSpPr>
+            <a:spLocks noGrp="1"/>
+          </p:cNvSpPr>
+          <p:nvPr>
+            <p:ph type="title"/>
+          </p:nvPr>
+        </p:nvSpPr>
+        <p:spPr/>
+        <p:txBody>
+          <a:bodyPr/>
+          <a:lstStyle/>
+          <a:p>
+            <a:r>
+              <a:rPr lang="en-US" dirty="0"/>
+              <a:t>Web </a:t>
+            </a:r>
+            <a:r>
+              <a:rPr lang="en-US" dirty="0" smtClean="0"/>
+              <a:t>Application</a:t>
+            </a:r>
+            <a:endParaRPr lang="en-US" dirty="0"/>
+          </a:p>
+        </p:txBody>
+      </p:sp>
+      <p:pic>
+        <p:nvPicPr>
+          <p:cNvPr id="4" name="Picture 3"/>
+          <p:cNvPicPr>
+            <a:picLocks noChangeAspect="1"/>
+          </p:cNvPicPr>
+          <p:nvPr/>
+        </p:nvPicPr>
+        <p:blipFill>
+          <a:blip r:embed="rId2" cstate="print">
+            <a:extLst>
+              <a:ext uri="{28A0092B-C50C-407E-A947-70E740481C1C}">
+                <a14:useLocalDpi xmlns:a14="http://schemas.microsoft.com/office/drawing/2010/main" val="0"/>
+              </a:ext>
+            </a:extLst>
+          </a:blip>
+          <a:stretch>
+            <a:fillRect/>
+          </a:stretch>
+        </p:blipFill>
+        <p:spPr>
+          <a:xfrm>
+            <a:off x="2587266" y="1443615"/>
+            <a:ext cx="7017468" cy="5414385"/>
+          </a:xfrm>
+          <a:prstGeom prst="rect">
+            <a:avLst/>
+          </a:prstGeom>
+        </p:spPr>
+      </p:pic>
+    </p:spTree>
+    <p:extLst>
+      <p:ext uri="{BB962C8B-B14F-4D97-AF65-F5344CB8AC3E}">
+        <p14:creationId xmlns:p14="http://schemas.microsoft.com/office/powerpoint/2010/main" val="1682236650"/>
+      </p:ext>
+    </p:extLst>
+  </p:cSld>
+  <p:clrMapOvr>
+    <a:masterClrMapping/>
+  </p:clrMapOvr>
+</p:sld>
+</file>
+
+<file path=ppt/slides/slide7.xml><?xml version="1.0" encoding="utf-8"?>
+<p:sld xmlns:a="http://schemas.openxmlformats.org/drawingml/2006/main" xmlns:r="http://schemas.openxmlformats.org/officeDocument/2006/relationships" xmlns:p="http://schemas.openxmlformats.org/presentationml/2006/main">
+  <p:cSld>
+    <p:spTree>
+      <p:nvGrpSpPr>
+        <p:cNvPr id="1" name=""/>
+        <p:cNvGrpSpPr/>
+        <p:nvPr/>
+      </p:nvGrpSpPr>
+      <p:grpSpPr>
+        <a:xfrm>
+          <a:off x="0" y="0"/>
+          <a:ext cx="0" cy="0"/>
+          <a:chOff x="0" y="0"/>
+          <a:chExt cx="0" cy="0"/>
+        </a:xfrm>
+      </p:grpSpPr>
+      <p:sp>
+        <p:nvSpPr>
+          <p:cNvPr id="2" name="Title 1"/>
+          <p:cNvSpPr>
+            <a:spLocks noGrp="1"/>
+          </p:cNvSpPr>
+          <p:nvPr>
+            <p:ph type="title"/>
+          </p:nvPr>
+        </p:nvSpPr>
+        <p:spPr/>
+        <p:txBody>
+          <a:bodyPr/>
+          <a:lstStyle/>
+          <a:p>
+            <a:endParaRPr lang="en-US"/>
+          </a:p>
+        </p:txBody>
+      </p:sp>
+      <p:sp>
+        <p:nvSpPr>
+          <p:cNvPr id="3" name="Content Placeholder 2"/>
+          <p:cNvSpPr>
+            <a:spLocks noGrp="1"/>
+          </p:cNvSpPr>
+          <p:nvPr>
+            <p:ph idx="1"/>
+          </p:nvPr>
+        </p:nvSpPr>
+        <p:spPr/>
+        <p:txBody>
+          <a:bodyPr/>
+          <a:lstStyle/>
+          <a:p>
+            <a:endParaRPr lang="en-US"/>
+          </a:p>
+        </p:txBody>
+      </p:sp>
+    </p:spTree>
+    <p:extLst>
+      <p:ext uri="{BB962C8B-B14F-4D97-AF65-F5344CB8AC3E}">
+        <p14:creationId xmlns:p14="http://schemas.microsoft.com/office/powerpoint/2010/main" val="777699753"/>
+      </p:ext>
+    </p:extLst>
+  </p:cSld>
+  <p:clrMapOvr>
+    <a:masterClrMapping/>
+  </p:clrMapOvr>
+</p:sld>
+</file>
+
+<file path=ppt/slides/slide8.xml><?xml version="1.0" encoding="utf-8"?>
+<p:sld xmlns:a="http://schemas.openxmlformats.org/drawingml/2006/main" xmlns:r="http://schemas.openxmlformats.org/officeDocument/2006/relationships" xmlns:p="http://schemas.openxmlformats.org/presentationml/2006/main">
+  <p:cSld>
+    <p:spTree>
+      <p:nvGrpSpPr>
+        <p:cNvPr id="1" name=""/>
+        <p:cNvGrpSpPr/>
+        <p:nvPr/>
+      </p:nvGrpSpPr>
+      <p:grpSpPr>
+        <a:xfrm>
+          <a:off x="0" y="0"/>
+          <a:ext cx="0" cy="0"/>
+          <a:chOff x="0" y="0"/>
+          <a:chExt cx="0" cy="0"/>
+        </a:xfrm>
+      </p:grpSpPr>
+      <p:sp>
+        <p:nvSpPr>
+          <p:cNvPr id="2" name="Title 1"/>
+          <p:cNvSpPr>
+            <a:spLocks noGrp="1"/>
+          </p:cNvSpPr>
+          <p:nvPr>
+            <p:ph type="title"/>
+          </p:nvPr>
+        </p:nvSpPr>
+        <p:spPr/>
+        <p:txBody>
+          <a:bodyPr/>
+          <a:lstStyle/>
+          <a:p>
+            <a:r>
+              <a:rPr lang="en-US" dirty="0" smtClean="0"/>
+              <a:t>Database</a:t>
+            </a:r>
+            <a:endParaRPr lang="en-US" dirty="0"/>
+          </a:p>
+        </p:txBody>
+      </p:sp>
+      <p:pic>
+        <p:nvPicPr>
+          <p:cNvPr id="6" name="Picture 5"/>
+          <p:cNvPicPr>
+            <a:picLocks noChangeAspect="1"/>
+          </p:cNvPicPr>
+          <p:nvPr/>
+        </p:nvPicPr>
+        <p:blipFill>
+          <a:blip r:embed="rId2" cstate="print">
+            <a:extLst>
+              <a:ext uri="{28A0092B-C50C-407E-A947-70E740481C1C}">
+                <a14:useLocalDpi xmlns:a14="http://schemas.microsoft.com/office/drawing/2010/main" val="0"/>
+              </a:ext>
+            </a:extLst>
+          </a:blip>
+          <a:stretch>
+            <a:fillRect/>
+          </a:stretch>
+        </p:blipFill>
+        <p:spPr>
+          <a:xfrm>
+            <a:off x="2506274" y="1310057"/>
+            <a:ext cx="7179452" cy="5547943"/>
+          </a:xfrm>
+          <a:prstGeom prst="rect">
+            <a:avLst/>
+          </a:prstGeom>
+        </p:spPr>
+      </p:pic>
+    </p:spTree>
+    <p:extLst>
+      <p:ext uri="{BB962C8B-B14F-4D97-AF65-F5344CB8AC3E}">
+        <p14:creationId xmlns:p14="http://schemas.microsoft.com/office/powerpoint/2010/main" val="4022403621"/>
+      </p:ext>
+    </p:extLst>
+  </p:cSld>
+  <p:clrMapOvr>
+    <a:masterClrMapping/>
+  </p:clrMapOvr>
+</p:sld>
+</file>
+
+<file path=ppt/slides/slide9.xml><?xml version="1.0" encoding="utf-8"?>
+<p:sld xmlns:a="http://schemas.openxmlformats.org/drawingml/2006/main" xmlns:r="http://schemas.openxmlformats.org/officeDocument/2006/relationships" xmlns:p="http://schemas.openxmlformats.org/presentationml/2006/main">
+  <p:cSld>
+    <p:spTree>
+      <p:nvGrpSpPr>
+        <p:cNvPr id="1" name=""/>
+        <p:cNvGrpSpPr/>
+        <p:nvPr/>
+      </p:nvGrpSpPr>
+      <p:grpSpPr>
+        <a:xfrm>
+          <a:off x="0" y="0"/>
+          <a:ext cx="0" cy="0"/>
+          <a:chOff x="0" y="0"/>
+          <a:chExt cx="0" cy="0"/>
+        </a:xfrm>
+      </p:grpSpPr>
+      <p:sp>
+        <p:nvSpPr>
+          <p:cNvPr id="2" name="Title 1"/>
+          <p:cNvSpPr>
+            <a:spLocks noGrp="1"/>
+          </p:cNvSpPr>
+          <p:nvPr>
+            <p:ph type="title"/>
+          </p:nvPr>
+        </p:nvSpPr>
+        <p:spPr/>
+        <p:txBody>
+          <a:bodyPr/>
+          <a:lstStyle/>
+          <a:p>
+            <a:r>
+              <a:rPr lang="en-US" dirty="0"/>
+              <a:t>User </a:t>
+            </a:r>
+            <a:r>
+              <a:rPr lang="en-US" dirty="0" smtClean="0"/>
+              <a:t>Manual</a:t>
+            </a:r>
+            <a:endParaRPr lang="en-US" dirty="0"/>
+          </a:p>
+        </p:txBody>
+      </p:sp>
+      <p:sp>
+        <p:nvSpPr>
+          <p:cNvPr id="3" name="Content Placeholder 2"/>
+          <p:cNvSpPr>
+            <a:spLocks noGrp="1"/>
+          </p:cNvSpPr>
+          <p:nvPr>
+            <p:ph idx="1"/>
+          </p:nvPr>
+        </p:nvSpPr>
+        <p:spPr/>
+        <p:txBody>
+          <a:bodyPr/>
+          <a:lstStyle/>
+          <a:p>
+            <a:endParaRPr lang="en-US" dirty="0"/>
+          </a:p>
+        </p:txBody>
+      </p:sp>
+    </p:spTree>
+    <p:extLst>
+      <p:ext uri="{BB962C8B-B14F-4D97-AF65-F5344CB8AC3E}">
+        <p14:creationId xmlns:p14="http://schemas.microsoft.com/office/powerpoint/2010/main" val="1781747835"/>
       </p:ext>
     </p:extLst>
   </p:cSld>

</xml_diff>